<commit_message>
update FRA_projects with V6 and push for new Flyback sim
update FRA_projects with V6 and push for new Flyback sim
</commit_message>
<xml_diff>
--- a/FRA_project/Frequency Response Analysis - Rev.5.pptx
+++ b/FRA_project/Frequency Response Analysis - Rev.5.pptx
@@ -2953,7 +2953,7 @@
           <a:p>
             <a:r>
               <a:rPr lang="en-US" dirty="0"/>
-              <a:t>Efficient Frequency Response Analysis block for Qspice - Rev.5</a:t>
+              <a:t>Efficient Frequency Response Analysis block for Qspice - Rev.6</a:t>
             </a:r>
             <a:endParaRPr lang="en-US" dirty="0"/>
           </a:p>
@@ -3552,7 +3552,7 @@
       </p:cxnSp>
       <p:pic>
         <p:nvPicPr>
-          <p:cNvPr id="7" name="Picture 6"/>
+          <p:cNvPr id="6" name="Picture 5"/>
           <p:cNvPicPr>
             <a:picLocks noChangeAspect="1"/>
           </p:cNvPicPr>
@@ -3566,8 +3566,8 @@
         </p:blipFill>
         <p:spPr>
           <a:xfrm>
-            <a:off x="8482965" y="1153160"/>
-            <a:ext cx="3519170" cy="4504690"/>
+            <a:off x="7976870" y="1153160"/>
+            <a:ext cx="3974465" cy="5071110"/>
           </a:xfrm>
           <a:prstGeom prst="rect">
             <a:avLst/>

</xml_diff>